<commit_message>
Nursinghome ppt visulization modified
</commit_message>
<xml_diff>
--- a/Nursing Home Analysis.pptx
+++ b/Nursing Home Analysis.pptx
@@ -254,7 +254,7 @@
           <a:p>
             <a:fld id="{D867F6A2-29EF-46E5-9E0C-25F190B82ABB}" type="datetimeFigureOut">
               <a:rPr lang="en-US" smtClean="0"/>
-              <a:t>7/26/2020</a:t>
+              <a:t>12/28/2020</a:t>
             </a:fld>
             <a:endParaRPr lang="en-US"/>
           </a:p>
@@ -752,7 +752,7 @@
           <a:p>
             <a:fld id="{437A928A-C659-423C-BB07-CE46C19146FA}" type="datetimeFigureOut">
               <a:rPr lang="en-US" smtClean="0"/>
-              <a:t>7/26/2020</a:t>
+              <a:t>12/28/2020</a:t>
             </a:fld>
             <a:endParaRPr lang="en-US"/>
           </a:p>
@@ -950,7 +950,7 @@
           <a:p>
             <a:fld id="{437A928A-C659-423C-BB07-CE46C19146FA}" type="datetimeFigureOut">
               <a:rPr lang="en-US" smtClean="0"/>
-              <a:t>7/26/2020</a:t>
+              <a:t>12/28/2020</a:t>
             </a:fld>
             <a:endParaRPr lang="en-US"/>
           </a:p>
@@ -1158,7 +1158,7 @@
           <a:p>
             <a:fld id="{437A928A-C659-423C-BB07-CE46C19146FA}" type="datetimeFigureOut">
               <a:rPr lang="en-US" smtClean="0"/>
-              <a:t>7/26/2020</a:t>
+              <a:t>12/28/2020</a:t>
             </a:fld>
             <a:endParaRPr lang="en-US"/>
           </a:p>
@@ -1976,7 +1976,7 @@
           <a:p>
             <a:fld id="{48A87A34-81AB-432B-8DAE-1953F412C126}" type="datetimeFigureOut">
               <a:rPr lang="en-US" smtClean="0"/>
-              <a:t>7/26/2020</a:t>
+              <a:t>12/28/2020</a:t>
             </a:fld>
             <a:endParaRPr lang="en-US" dirty="0"/>
           </a:p>
@@ -2380,7 +2380,7 @@
           <a:p>
             <a:fld id="{48A87A34-81AB-432B-8DAE-1953F412C126}" type="datetimeFigureOut">
               <a:rPr lang="en-US" smtClean="0"/>
-              <a:t>7/26/2020</a:t>
+              <a:t>12/28/2020</a:t>
             </a:fld>
             <a:endParaRPr lang="en-US" dirty="0"/>
           </a:p>
@@ -2636,7 +2636,7 @@
           <a:p>
             <a:fld id="{48A87A34-81AB-432B-8DAE-1953F412C126}" type="datetimeFigureOut">
               <a:rPr lang="en-US" smtClean="0"/>
-              <a:t>7/26/2020</a:t>
+              <a:t>12/28/2020</a:t>
             </a:fld>
             <a:endParaRPr lang="en-US" dirty="0"/>
           </a:p>
@@ -2927,7 +2927,7 @@
           <a:p>
             <a:fld id="{48A87A34-81AB-432B-8DAE-1953F412C126}" type="datetimeFigureOut">
               <a:rPr lang="en-US" smtClean="0"/>
-              <a:t>7/26/2020</a:t>
+              <a:t>12/28/2020</a:t>
             </a:fld>
             <a:endParaRPr lang="en-US" dirty="0"/>
           </a:p>
@@ -3310,7 +3310,7 @@
           <a:p>
             <a:fld id="{48A87A34-81AB-432B-8DAE-1953F412C126}" type="datetimeFigureOut">
               <a:rPr lang="en-US" smtClean="0"/>
-              <a:t>7/26/2020</a:t>
+              <a:t>12/28/2020</a:t>
             </a:fld>
             <a:endParaRPr lang="en-US" dirty="0"/>
           </a:p>
@@ -3442,7 +3442,7 @@
           <a:p>
             <a:fld id="{48A87A34-81AB-432B-8DAE-1953F412C126}" type="datetimeFigureOut">
               <a:rPr lang="en-US" smtClean="0"/>
-              <a:t>7/26/2020</a:t>
+              <a:t>12/28/2020</a:t>
             </a:fld>
             <a:endParaRPr lang="en-US" dirty="0"/>
           </a:p>
@@ -3546,7 +3546,7 @@
           <a:p>
             <a:fld id="{48A87A34-81AB-432B-8DAE-1953F412C126}" type="datetimeFigureOut">
               <a:rPr lang="en-US" smtClean="0"/>
-              <a:t>7/26/2020</a:t>
+              <a:t>12/28/2020</a:t>
             </a:fld>
             <a:endParaRPr lang="en-US" dirty="0"/>
           </a:p>
@@ -3810,7 +3810,7 @@
           <a:p>
             <a:fld id="{48A87A34-81AB-432B-8DAE-1953F412C126}" type="datetimeFigureOut">
               <a:rPr lang="en-US" smtClean="0"/>
-              <a:t>7/26/2020</a:t>
+              <a:t>12/28/2020</a:t>
             </a:fld>
             <a:endParaRPr lang="en-US" dirty="0"/>
           </a:p>
@@ -4005,7 +4005,7 @@
           <a:p>
             <a:fld id="{437A928A-C659-423C-BB07-CE46C19146FA}" type="datetimeFigureOut">
               <a:rPr lang="en-US" smtClean="0"/>
-              <a:t>7/26/2020</a:t>
+              <a:t>12/28/2020</a:t>
             </a:fld>
             <a:endParaRPr lang="en-US"/>
           </a:p>
@@ -4332,7 +4332,7 @@
             <a:fld id="{48A87A34-81AB-432B-8DAE-1953F412C126}" type="datetimeFigureOut">
               <a:rPr lang="en-US" smtClean="0"/>
               <a:pPr/>
-              <a:t>7/26/2020</a:t>
+              <a:t>12/28/2020</a:t>
             </a:fld>
             <a:endParaRPr lang="en-US" dirty="0"/>
           </a:p>
@@ -4542,7 +4542,7 @@
             <a:fld id="{48A87A34-81AB-432B-8DAE-1953F412C126}" type="datetimeFigureOut">
               <a:rPr lang="en-US" smtClean="0"/>
               <a:pPr/>
-              <a:t>7/26/2020</a:t>
+              <a:t>12/28/2020</a:t>
             </a:fld>
             <a:endParaRPr lang="en-US" dirty="0"/>
           </a:p>
@@ -4867,7 +4867,7 @@
             <a:fld id="{48A87A34-81AB-432B-8DAE-1953F412C126}" type="datetimeFigureOut">
               <a:rPr lang="en-US" smtClean="0"/>
               <a:pPr/>
-              <a:t>7/26/2020</a:t>
+              <a:t>12/28/2020</a:t>
             </a:fld>
             <a:endParaRPr lang="en-US" dirty="0"/>
           </a:p>
@@ -5211,7 +5211,7 @@
             <a:fld id="{48A87A34-81AB-432B-8DAE-1953F412C126}" type="datetimeFigureOut">
               <a:rPr lang="en-US" smtClean="0"/>
               <a:pPr/>
-              <a:t>7/26/2020</a:t>
+              <a:t>12/28/2020</a:t>
             </a:fld>
             <a:endParaRPr lang="en-US" dirty="0"/>
           </a:p>
@@ -5536,7 +5536,7 @@
             <a:fld id="{48A87A34-81AB-432B-8DAE-1953F412C126}" type="datetimeFigureOut">
               <a:rPr lang="en-US" smtClean="0"/>
               <a:pPr/>
-              <a:t>7/26/2020</a:t>
+              <a:t>12/28/2020</a:t>
             </a:fld>
             <a:endParaRPr lang="en-US" dirty="0"/>
           </a:p>
@@ -5940,7 +5940,7 @@
             <a:fld id="{48A87A34-81AB-432B-8DAE-1953F412C126}" type="datetimeFigureOut">
               <a:rPr lang="en-US" smtClean="0"/>
               <a:pPr/>
-              <a:t>7/26/2020</a:t>
+              <a:t>12/28/2020</a:t>
             </a:fld>
             <a:endParaRPr lang="en-US" dirty="0"/>
           </a:p>
@@ -6120,7 +6120,7 @@
           <a:p>
             <a:fld id="{48A87A34-81AB-432B-8DAE-1953F412C126}" type="datetimeFigureOut">
               <a:rPr lang="en-US" smtClean="0"/>
-              <a:t>7/26/2020</a:t>
+              <a:t>12/28/2020</a:t>
             </a:fld>
             <a:endParaRPr lang="en-US" dirty="0"/>
           </a:p>
@@ -6310,7 +6310,7 @@
           <a:p>
             <a:fld id="{48A87A34-81AB-432B-8DAE-1953F412C126}" type="datetimeFigureOut">
               <a:rPr lang="en-US" smtClean="0"/>
-              <a:t>7/26/2020</a:t>
+              <a:t>12/28/2020</a:t>
             </a:fld>
             <a:endParaRPr lang="en-US" dirty="0"/>
           </a:p>
@@ -7446,7 +7446,7 @@
           <a:p>
             <a:fld id="{437A928A-C659-423C-BB07-CE46C19146FA}" type="datetimeFigureOut">
               <a:rPr lang="en-US" smtClean="0"/>
-              <a:t>7/26/2020</a:t>
+              <a:t>12/28/2020</a:t>
             </a:fld>
             <a:endParaRPr lang="en-US"/>
           </a:p>
@@ -15479,7 +15479,7 @@
           <a:p>
             <a:fld id="{437A928A-C659-423C-BB07-CE46C19146FA}" type="datetimeFigureOut">
               <a:rPr lang="en-US" smtClean="0"/>
-              <a:t>7/26/2020</a:t>
+              <a:t>12/28/2020</a:t>
             </a:fld>
             <a:endParaRPr lang="en-US"/>
           </a:p>
@@ -23016,7 +23016,7 @@
           <a:p>
             <a:fld id="{437A928A-C659-423C-BB07-CE46C19146FA}" type="datetimeFigureOut">
               <a:rPr lang="en-US" smtClean="0"/>
-              <a:t>7/26/2020</a:t>
+              <a:t>12/28/2020</a:t>
             </a:fld>
             <a:endParaRPr lang="en-US"/>
           </a:p>
@@ -24197,7 +24197,7 @@
           <a:p>
             <a:fld id="{437A928A-C659-423C-BB07-CE46C19146FA}" type="datetimeFigureOut">
               <a:rPr lang="en-US" smtClean="0"/>
-              <a:t>7/26/2020</a:t>
+              <a:t>12/28/2020</a:t>
             </a:fld>
             <a:endParaRPr lang="en-US"/>
           </a:p>
@@ -24310,7 +24310,7 @@
           <a:p>
             <a:fld id="{437A928A-C659-423C-BB07-CE46C19146FA}" type="datetimeFigureOut">
               <a:rPr lang="en-US" smtClean="0"/>
-              <a:t>7/26/2020</a:t>
+              <a:t>12/28/2020</a:t>
             </a:fld>
             <a:endParaRPr lang="en-US"/>
           </a:p>
@@ -24621,7 +24621,7 @@
           <a:p>
             <a:fld id="{437A928A-C659-423C-BB07-CE46C19146FA}" type="datetimeFigureOut">
               <a:rPr lang="en-US" smtClean="0"/>
-              <a:t>7/26/2020</a:t>
+              <a:t>12/28/2020</a:t>
             </a:fld>
             <a:endParaRPr lang="en-US"/>
           </a:p>
@@ -24909,7 +24909,7 @@
           <a:p>
             <a:fld id="{437A928A-C659-423C-BB07-CE46C19146FA}" type="datetimeFigureOut">
               <a:rPr lang="en-US" smtClean="0"/>
-              <a:t>7/26/2020</a:t>
+              <a:t>12/28/2020</a:t>
             </a:fld>
             <a:endParaRPr lang="en-US"/>
           </a:p>
@@ -25151,7 +25151,7 @@
             <a:fld id="{48A87A34-81AB-432B-8DAE-1953F412C126}" type="datetimeFigureOut">
               <a:rPr lang="en-US" smtClean="0"/>
               <a:pPr/>
-              <a:t>7/26/2020</a:t>
+              <a:t>12/28/2020</a:t>
             </a:fld>
             <a:endParaRPr lang="en-US" dirty="0"/>
           </a:p>
@@ -26245,7 +26245,7 @@
             <a:fld id="{48A87A34-81AB-432B-8DAE-1953F412C126}" type="datetimeFigureOut">
               <a:rPr lang="en-US" smtClean="0"/>
               <a:pPr/>
-              <a:t>7/26/2020</a:t>
+              <a:t>12/28/2020</a:t>
             </a:fld>
             <a:endParaRPr lang="en-US" dirty="0"/>
           </a:p>
@@ -28437,8 +28437,8 @@
           </a:p>
         </p:txBody>
       </p:sp>
-      <mc:AlternateContent xmlns:mc="http://schemas.openxmlformats.org/markup-compatibility/2006">
-        <mc:Choice xmlns:p14="http://schemas.microsoft.com/office/powerpoint/2010/main" xmlns:aink="http://schemas.microsoft.com/office/drawing/2016/ink" Requires="p14 aink">
+      <mc:AlternateContent xmlns:mc="http://schemas.openxmlformats.org/markup-compatibility/2006" xmlns:p14="http://schemas.microsoft.com/office/powerpoint/2010/main" xmlns:aink="http://schemas.microsoft.com/office/drawing/2016/ink">
+        <mc:Choice Requires="p14 aink">
           <p:contentPart p14:bwMode="auto" r:id="rId3">
             <p14:nvContentPartPr>
               <p14:cNvPr id="29" name="Ink 28">
@@ -28457,7 +28457,7 @@
             </p14:xfrm>
           </p:contentPart>
         </mc:Choice>
-        <mc:Fallback>
+        <mc:Fallback xmlns="">
           <p:pic>
             <p:nvPicPr>
               <p:cNvPr id="29" name="Ink 28">
@@ -31265,41 +31265,6 @@
           <a:chExt cx="0" cy="0"/>
         </a:xfrm>
       </p:grpSpPr>
-      <p:pic>
-        <p:nvPicPr>
-          <p:cNvPr id="6" name="Content Placeholder 5" descr="A screenshot of a cell phone&#10;&#10;Description automatically generated">
-            <a:extLst>
-              <a:ext uri="{FF2B5EF4-FFF2-40B4-BE49-F238E27FC236}">
-                <a16:creationId xmlns:a16="http://schemas.microsoft.com/office/drawing/2014/main" id="{EC52585B-0DA4-47F9-B3DC-1CAE0E46825E}"/>
-              </a:ext>
-            </a:extLst>
-          </p:cNvPr>
-          <p:cNvPicPr>
-            <a:picLocks noGrp="1" noChangeAspect="1"/>
-          </p:cNvPicPr>
-          <p:nvPr>
-            <p:ph idx="1"/>
-          </p:nvPr>
-        </p:nvPicPr>
-        <p:blipFill>
-          <a:blip r:embed="rId2">
-            <a:extLst>
-              <a:ext uri="{28A0092B-C50C-407E-A947-70E740481C1C}">
-                <a14:useLocalDpi xmlns:a14="http://schemas.microsoft.com/office/drawing/2010/main" val="0"/>
-              </a:ext>
-            </a:extLst>
-          </a:blip>
-          <a:stretch>
-            <a:fillRect/>
-          </a:stretch>
-        </p:blipFill>
-        <p:spPr>
-          <a:xfrm>
-            <a:off x="166255" y="178087"/>
-            <a:ext cx="5541818" cy="4089111"/>
-          </a:xfrm>
-        </p:spPr>
-      </p:pic>
       <p:sp>
         <p:nvSpPr>
           <p:cNvPr id="4" name="Slide Number Placeholder 3">
@@ -31344,7 +31309,7 @@
           <p:nvPr/>
         </p:nvPicPr>
         <p:blipFill>
-          <a:blip r:embed="rId3">
+          <a:blip r:embed="rId2">
             <a:extLst>
               <a:ext uri="{28A0092B-C50C-407E-A947-70E740481C1C}">
                 <a14:useLocalDpi xmlns:a14="http://schemas.microsoft.com/office/drawing/2010/main" val="0"/>
@@ -31418,7 +31383,7 @@
           <p:nvPr/>
         </p:nvPicPr>
         <p:blipFill rotWithShape="1">
-          <a:blip r:embed="rId4" cstate="screen">
+          <a:blip r:embed="rId3" cstate="screen">
             <a:extLst>
               <a:ext uri="{28A0092B-C50C-407E-A947-70E740481C1C}">
                 <a14:useLocalDpi xmlns:a14="http://schemas.microsoft.com/office/drawing/2010/main"/>
@@ -31438,6 +31403,77 @@
           </a:prstGeom>
         </p:spPr>
       </p:pic>
+      <p:pic>
+        <p:nvPicPr>
+          <p:cNvPr id="3" name="Picture 2" descr="Chart, bar chart&#10;&#10;Description automatically generated">
+            <a:extLst>
+              <a:ext uri="{FF2B5EF4-FFF2-40B4-BE49-F238E27FC236}">
+                <a16:creationId xmlns:a16="http://schemas.microsoft.com/office/drawing/2014/main" id="{7268C909-8A1F-4E0F-A5C2-BA6414AC4806}"/>
+              </a:ext>
+            </a:extLst>
+          </p:cNvPr>
+          <p:cNvPicPr>
+            <a:picLocks noChangeAspect="1"/>
+          </p:cNvPicPr>
+          <p:nvPr/>
+        </p:nvPicPr>
+        <p:blipFill>
+          <a:blip r:embed="rId4">
+            <a:extLst>
+              <a:ext uri="{28A0092B-C50C-407E-A947-70E740481C1C}">
+                <a14:useLocalDpi xmlns:a14="http://schemas.microsoft.com/office/drawing/2010/main" val="0"/>
+              </a:ext>
+            </a:extLst>
+          </a:blip>
+          <a:stretch>
+            <a:fillRect/>
+          </a:stretch>
+        </p:blipFill>
+        <p:spPr>
+          <a:xfrm>
+            <a:off x="116966" y="377283"/>
+            <a:ext cx="5439264" cy="3732261"/>
+          </a:xfrm>
+          <a:prstGeom prst="rect">
+            <a:avLst/>
+          </a:prstGeom>
+        </p:spPr>
+      </p:pic>
+      <p:sp>
+        <p:nvSpPr>
+          <p:cNvPr id="5" name="Content Placeholder 4">
+            <a:extLst>
+              <a:ext uri="{FF2B5EF4-FFF2-40B4-BE49-F238E27FC236}">
+                <a16:creationId xmlns:a16="http://schemas.microsoft.com/office/drawing/2014/main" id="{7FF1D706-A58D-474E-AA2F-808365586BC8}"/>
+              </a:ext>
+            </a:extLst>
+          </p:cNvPr>
+          <p:cNvSpPr>
+            <a:spLocks noGrp="1"/>
+          </p:cNvSpPr>
+          <p:nvPr>
+            <p:ph idx="1"/>
+          </p:nvPr>
+        </p:nvSpPr>
+        <p:spPr>
+          <a:xfrm flipV="1">
+            <a:off x="0" y="6857997"/>
+            <a:ext cx="11353800" cy="45719"/>
+          </a:xfrm>
+        </p:spPr>
+        <p:txBody>
+          <a:bodyPr>
+            <a:normAutofit fontScale="25000" lnSpcReduction="20000"/>
+          </a:bodyPr>
+          <a:lstStyle/>
+          <a:p>
+            <a:pPr marL="0" indent="0">
+              <a:buNone/>
+            </a:pPr>
+            <a:endParaRPr lang="en-US" dirty="0"/>
+          </a:p>
+        </p:txBody>
+      </p:sp>
     </p:spTree>
     <p:extLst>
       <p:ext uri="{BB962C8B-B14F-4D97-AF65-F5344CB8AC3E}">

</xml_diff>